<commit_message>
1. Change repository name to GatherHub 2. Update README.md 3. Update project documents
</commit_message>
<xml_diff>
--- a/doc/Design Note - Teleboard.pptx
+++ b/doc/Design Note - Teleboard.pptx
@@ -259,7 +259,7 @@
           <a:p>
             <a:fld id="{436FB6E3-5D8B-406C-9076-B29BD2B6DA25}" type="datetimeFigureOut">
               <a:rPr lang="zh-TW" altLang="en-US" smtClean="0"/>
-              <a:t>2015/7/29</a:t>
+              <a:t>2015/7/28</a:t>
             </a:fld>
             <a:endParaRPr lang="zh-TW" altLang="en-US"/>
           </a:p>
@@ -429,7 +429,7 @@
           <a:p>
             <a:fld id="{436FB6E3-5D8B-406C-9076-B29BD2B6DA25}" type="datetimeFigureOut">
               <a:rPr lang="zh-TW" altLang="en-US" smtClean="0"/>
-              <a:t>2015/7/29</a:t>
+              <a:t>2015/7/28</a:t>
             </a:fld>
             <a:endParaRPr lang="zh-TW" altLang="en-US"/>
           </a:p>
@@ -609,7 +609,7 @@
           <a:p>
             <a:fld id="{436FB6E3-5D8B-406C-9076-B29BD2B6DA25}" type="datetimeFigureOut">
               <a:rPr lang="zh-TW" altLang="en-US" smtClean="0"/>
-              <a:t>2015/7/29</a:t>
+              <a:t>2015/7/28</a:t>
             </a:fld>
             <a:endParaRPr lang="zh-TW" altLang="en-US"/>
           </a:p>
@@ -779,7 +779,7 @@
           <a:p>
             <a:fld id="{436FB6E3-5D8B-406C-9076-B29BD2B6DA25}" type="datetimeFigureOut">
               <a:rPr lang="zh-TW" altLang="en-US" smtClean="0"/>
-              <a:t>2015/7/29</a:t>
+              <a:t>2015/7/28</a:t>
             </a:fld>
             <a:endParaRPr lang="zh-TW" altLang="en-US"/>
           </a:p>
@@ -1025,7 +1025,7 @@
           <a:p>
             <a:fld id="{436FB6E3-5D8B-406C-9076-B29BD2B6DA25}" type="datetimeFigureOut">
               <a:rPr lang="zh-TW" altLang="en-US" smtClean="0"/>
-              <a:t>2015/7/29</a:t>
+              <a:t>2015/7/28</a:t>
             </a:fld>
             <a:endParaRPr lang="zh-TW" altLang="en-US"/>
           </a:p>
@@ -1257,7 +1257,7 @@
           <a:p>
             <a:fld id="{436FB6E3-5D8B-406C-9076-B29BD2B6DA25}" type="datetimeFigureOut">
               <a:rPr lang="zh-TW" altLang="en-US" smtClean="0"/>
-              <a:t>2015/7/29</a:t>
+              <a:t>2015/7/28</a:t>
             </a:fld>
             <a:endParaRPr lang="zh-TW" altLang="en-US"/>
           </a:p>
@@ -1624,7 +1624,7 @@
           <a:p>
             <a:fld id="{436FB6E3-5D8B-406C-9076-B29BD2B6DA25}" type="datetimeFigureOut">
               <a:rPr lang="zh-TW" altLang="en-US" smtClean="0"/>
-              <a:t>2015/7/29</a:t>
+              <a:t>2015/7/28</a:t>
             </a:fld>
             <a:endParaRPr lang="zh-TW" altLang="en-US"/>
           </a:p>
@@ -1742,7 +1742,7 @@
           <a:p>
             <a:fld id="{436FB6E3-5D8B-406C-9076-B29BD2B6DA25}" type="datetimeFigureOut">
               <a:rPr lang="zh-TW" altLang="en-US" smtClean="0"/>
-              <a:t>2015/7/29</a:t>
+              <a:t>2015/7/28</a:t>
             </a:fld>
             <a:endParaRPr lang="zh-TW" altLang="en-US"/>
           </a:p>
@@ -1837,7 +1837,7 @@
           <a:p>
             <a:fld id="{436FB6E3-5D8B-406C-9076-B29BD2B6DA25}" type="datetimeFigureOut">
               <a:rPr lang="zh-TW" altLang="en-US" smtClean="0"/>
-              <a:t>2015/7/29</a:t>
+              <a:t>2015/7/28</a:t>
             </a:fld>
             <a:endParaRPr lang="zh-TW" altLang="en-US"/>
           </a:p>
@@ -2114,7 +2114,7 @@
           <a:p>
             <a:fld id="{436FB6E3-5D8B-406C-9076-B29BD2B6DA25}" type="datetimeFigureOut">
               <a:rPr lang="zh-TW" altLang="en-US" smtClean="0"/>
-              <a:t>2015/7/29</a:t>
+              <a:t>2015/7/28</a:t>
             </a:fld>
             <a:endParaRPr lang="zh-TW" altLang="en-US"/>
           </a:p>
@@ -2367,7 +2367,7 @@
           <a:p>
             <a:fld id="{436FB6E3-5D8B-406C-9076-B29BD2B6DA25}" type="datetimeFigureOut">
               <a:rPr lang="zh-TW" altLang="en-US" smtClean="0"/>
-              <a:t>2015/7/29</a:t>
+              <a:t>2015/7/28</a:t>
             </a:fld>
             <a:endParaRPr lang="zh-TW" altLang="en-US"/>
           </a:p>
@@ -2580,7 +2580,7 @@
           <a:p>
             <a:fld id="{436FB6E3-5D8B-406C-9076-B29BD2B6DA25}" type="datetimeFigureOut">
               <a:rPr lang="zh-TW" altLang="en-US" smtClean="0"/>
-              <a:t>2015/7/29</a:t>
+              <a:t>2015/7/28</a:t>
             </a:fld>
             <a:endParaRPr lang="zh-TW" altLang="en-US"/>
           </a:p>
@@ -3006,7 +3006,11 @@
             </a:r>
             <a:r>
               <a:rPr lang="en-US" altLang="zh-CN" dirty="0" smtClean="0"/>
-              <a:t> Design Note</a:t>
+              <a:t> Design </a:t>
+            </a:r>
+            <a:r>
+              <a:rPr lang="en-US" altLang="zh-CN" dirty="0" smtClean="0"/>
+              <a:t>Note</a:t>
             </a:r>
             <a:endParaRPr lang="zh-TW" altLang="en-US" dirty="0"/>
           </a:p>
@@ -3427,15 +3431,11 @@
             </a:r>
             <a:r>
               <a:rPr lang="en-US" altLang="zh-TW" dirty="0" err="1" smtClean="0"/>
-              <a:t>Teleboard</a:t>
+              <a:t>ShareBoard</a:t>
             </a:r>
             <a:r>
               <a:rPr lang="en-US" altLang="zh-TW" dirty="0" smtClean="0"/>
-              <a:t> </a:t>
-            </a:r>
-            <a:r>
-              <a:rPr lang="en-US" altLang="zh-TW" dirty="0" smtClean="0"/>
-              <a:t>page identified by session ID.</a:t>
+              <a:t> page identified by session ID.</a:t>
             </a:r>
           </a:p>
           <a:p>
@@ -3445,15 +3445,11 @@
             </a:r>
             <a:r>
               <a:rPr lang="en-US" altLang="zh-TW" dirty="0" err="1" smtClean="0"/>
-              <a:t>Teleboard</a:t>
+              <a:t>ShareBoard</a:t>
             </a:r>
             <a:r>
               <a:rPr lang="en-US" altLang="zh-TW" dirty="0" smtClean="0"/>
-              <a:t> </a:t>
-            </a:r>
-            <a:r>
-              <a:rPr lang="en-US" altLang="zh-TW" dirty="0" smtClean="0"/>
-              <a:t>will be translated into a (series) action event and submitted to the server with AJAX.</a:t>
+              <a:t> will be translated into a (series) action event and submitted to the server with AJAX.</a:t>
             </a:r>
           </a:p>
           <a:p>
@@ -3853,7 +3849,13 @@
               <a:rPr lang="en-US" altLang="zh-TW" dirty="0" smtClean="0">
                 <a:hlinkClick r:id="rId3"/>
               </a:rPr>
-              <a:t>http://blog.tonycube.com/2012/02/html5-canvas-1-canvas.html</a:t>
+              <a:t>http://</a:t>
+            </a:r>
+            <a:r>
+              <a:rPr lang="en-US" altLang="zh-TW" dirty="0" smtClean="0">
+                <a:hlinkClick r:id="rId3"/>
+              </a:rPr>
+              <a:t>blog.tonycube.com/2012/02/html5-canvas-1-canvas.html</a:t>
             </a:r>
             <a:endParaRPr lang="en-US" altLang="zh-TW" dirty="0" smtClean="0"/>
           </a:p>

</xml_diff>

<commit_message>
Update documents and test for Asana integration #47607268587929
</commit_message>
<xml_diff>
--- a/doc/Design Note - Teleboard.pptx
+++ b/doc/Design Note - Teleboard.pptx
@@ -259,7 +259,7 @@
           <a:p>
             <a:fld id="{436FB6E3-5D8B-406C-9076-B29BD2B6DA25}" type="datetimeFigureOut">
               <a:rPr lang="zh-TW" altLang="en-US" smtClean="0"/>
-              <a:t>2015/7/28</a:t>
+              <a:t>2015/8/25</a:t>
             </a:fld>
             <a:endParaRPr lang="zh-TW" altLang="en-US"/>
           </a:p>
@@ -429,7 +429,7 @@
           <a:p>
             <a:fld id="{436FB6E3-5D8B-406C-9076-B29BD2B6DA25}" type="datetimeFigureOut">
               <a:rPr lang="zh-TW" altLang="en-US" smtClean="0"/>
-              <a:t>2015/7/28</a:t>
+              <a:t>2015/8/25</a:t>
             </a:fld>
             <a:endParaRPr lang="zh-TW" altLang="en-US"/>
           </a:p>
@@ -609,7 +609,7 @@
           <a:p>
             <a:fld id="{436FB6E3-5D8B-406C-9076-B29BD2B6DA25}" type="datetimeFigureOut">
               <a:rPr lang="zh-TW" altLang="en-US" smtClean="0"/>
-              <a:t>2015/7/28</a:t>
+              <a:t>2015/8/25</a:t>
             </a:fld>
             <a:endParaRPr lang="zh-TW" altLang="en-US"/>
           </a:p>
@@ -779,7 +779,7 @@
           <a:p>
             <a:fld id="{436FB6E3-5D8B-406C-9076-B29BD2B6DA25}" type="datetimeFigureOut">
               <a:rPr lang="zh-TW" altLang="en-US" smtClean="0"/>
-              <a:t>2015/7/28</a:t>
+              <a:t>2015/8/25</a:t>
             </a:fld>
             <a:endParaRPr lang="zh-TW" altLang="en-US"/>
           </a:p>
@@ -1025,7 +1025,7 @@
           <a:p>
             <a:fld id="{436FB6E3-5D8B-406C-9076-B29BD2B6DA25}" type="datetimeFigureOut">
               <a:rPr lang="zh-TW" altLang="en-US" smtClean="0"/>
-              <a:t>2015/7/28</a:t>
+              <a:t>2015/8/25</a:t>
             </a:fld>
             <a:endParaRPr lang="zh-TW" altLang="en-US"/>
           </a:p>
@@ -1257,7 +1257,7 @@
           <a:p>
             <a:fld id="{436FB6E3-5D8B-406C-9076-B29BD2B6DA25}" type="datetimeFigureOut">
               <a:rPr lang="zh-TW" altLang="en-US" smtClean="0"/>
-              <a:t>2015/7/28</a:t>
+              <a:t>2015/8/25</a:t>
             </a:fld>
             <a:endParaRPr lang="zh-TW" altLang="en-US"/>
           </a:p>
@@ -1624,7 +1624,7 @@
           <a:p>
             <a:fld id="{436FB6E3-5D8B-406C-9076-B29BD2B6DA25}" type="datetimeFigureOut">
               <a:rPr lang="zh-TW" altLang="en-US" smtClean="0"/>
-              <a:t>2015/7/28</a:t>
+              <a:t>2015/8/25</a:t>
             </a:fld>
             <a:endParaRPr lang="zh-TW" altLang="en-US"/>
           </a:p>
@@ -1742,7 +1742,7 @@
           <a:p>
             <a:fld id="{436FB6E3-5D8B-406C-9076-B29BD2B6DA25}" type="datetimeFigureOut">
               <a:rPr lang="zh-TW" altLang="en-US" smtClean="0"/>
-              <a:t>2015/7/28</a:t>
+              <a:t>2015/8/25</a:t>
             </a:fld>
             <a:endParaRPr lang="zh-TW" altLang="en-US"/>
           </a:p>
@@ -1837,7 +1837,7 @@
           <a:p>
             <a:fld id="{436FB6E3-5D8B-406C-9076-B29BD2B6DA25}" type="datetimeFigureOut">
               <a:rPr lang="zh-TW" altLang="en-US" smtClean="0"/>
-              <a:t>2015/7/28</a:t>
+              <a:t>2015/8/25</a:t>
             </a:fld>
             <a:endParaRPr lang="zh-TW" altLang="en-US"/>
           </a:p>
@@ -2114,7 +2114,7 @@
           <a:p>
             <a:fld id="{436FB6E3-5D8B-406C-9076-B29BD2B6DA25}" type="datetimeFigureOut">
               <a:rPr lang="zh-TW" altLang="en-US" smtClean="0"/>
-              <a:t>2015/7/28</a:t>
+              <a:t>2015/8/25</a:t>
             </a:fld>
             <a:endParaRPr lang="zh-TW" altLang="en-US"/>
           </a:p>
@@ -2367,7 +2367,7 @@
           <a:p>
             <a:fld id="{436FB6E3-5D8B-406C-9076-B29BD2B6DA25}" type="datetimeFigureOut">
               <a:rPr lang="zh-TW" altLang="en-US" smtClean="0"/>
-              <a:t>2015/7/28</a:t>
+              <a:t>2015/8/25</a:t>
             </a:fld>
             <a:endParaRPr lang="zh-TW" altLang="en-US"/>
           </a:p>
@@ -2580,7 +2580,7 @@
           <a:p>
             <a:fld id="{436FB6E3-5D8B-406C-9076-B29BD2B6DA25}" type="datetimeFigureOut">
               <a:rPr lang="zh-TW" altLang="en-US" smtClean="0"/>
-              <a:t>2015/7/28</a:t>
+              <a:t>2015/8/25</a:t>
             </a:fld>
             <a:endParaRPr lang="zh-TW" altLang="en-US"/>
           </a:p>
@@ -3006,11 +3006,7 @@
             </a:r>
             <a:r>
               <a:rPr lang="en-US" altLang="zh-CN" dirty="0" smtClean="0"/>
-              <a:t> Design </a:t>
-            </a:r>
-            <a:r>
-              <a:rPr lang="en-US" altLang="zh-CN" dirty="0" smtClean="0"/>
-              <a:t>Note</a:t>
+              <a:t> Design Note</a:t>
             </a:r>
             <a:endParaRPr lang="zh-TW" altLang="en-US" dirty="0"/>
           </a:p>
@@ -3018,7 +3014,78 @@
       </p:sp>
       <p:sp>
         <p:nvSpPr>
-          <p:cNvPr id="3" name="副标题 2"/>
+          <p:cNvPr id="4" name="文本框 3"/>
+          <p:cNvSpPr txBox="1"/>
+          <p:nvPr/>
+        </p:nvSpPr>
+        <p:spPr>
+          <a:xfrm>
+            <a:off x="4606413" y="5185647"/>
+            <a:ext cx="2979174" cy="830997"/>
+          </a:xfrm>
+          <a:prstGeom prst="rect">
+            <a:avLst/>
+          </a:prstGeom>
+          <a:noFill/>
+        </p:spPr>
+        <p:txBody>
+          <a:bodyPr wrap="square" rtlCol="0">
+            <a:spAutoFit/>
+          </a:bodyPr>
+          <a:lstStyle/>
+          <a:p>
+            <a:pPr algn="ctr"/>
+            <a:r>
+              <a:rPr lang="en-US" altLang="zh-CN" sz="4800" dirty="0" smtClean="0">
+                <a:solidFill>
+                  <a:srgbClr val="0070C0"/>
+                </a:solidFill>
+                <a:latin typeface="Forte" panose="03060902040502070203" pitchFamily="66" charset="0"/>
+              </a:rPr>
+              <a:t>Gather</a:t>
+            </a:r>
+            <a:r>
+              <a:rPr lang="en-US" altLang="zh-CN" sz="4800" dirty="0" smtClean="0">
+                <a:solidFill>
+                  <a:srgbClr val="FF0000"/>
+                </a:solidFill>
+                <a:latin typeface="Forte" panose="03060902040502070203" pitchFamily="66" charset="0"/>
+              </a:rPr>
+              <a:t>H</a:t>
+            </a:r>
+            <a:r>
+              <a:rPr lang="en-US" altLang="zh-CN" sz="4800" dirty="0" smtClean="0">
+                <a:solidFill>
+                  <a:schemeClr val="accent4">
+                    <a:lumMod val="60000"/>
+                    <a:lumOff val="40000"/>
+                  </a:schemeClr>
+                </a:solidFill>
+                <a:latin typeface="Forte" panose="03060902040502070203" pitchFamily="66" charset="0"/>
+              </a:rPr>
+              <a:t>u</a:t>
+            </a:r>
+            <a:r>
+              <a:rPr lang="en-US" altLang="zh-CN" sz="4800" dirty="0" smtClean="0">
+                <a:solidFill>
+                  <a:srgbClr val="00B050"/>
+                </a:solidFill>
+                <a:latin typeface="Forte" panose="03060902040502070203" pitchFamily="66" charset="0"/>
+              </a:rPr>
+              <a:t>b</a:t>
+            </a:r>
+            <a:endParaRPr lang="zh-TW" altLang="en-US" dirty="0">
+              <a:solidFill>
+                <a:srgbClr val="00B050"/>
+              </a:solidFill>
+              <a:latin typeface="Forte" panose="03060902040502070203" pitchFamily="66" charset="0"/>
+            </a:endParaRPr>
+          </a:p>
+        </p:txBody>
+      </p:sp>
+      <p:sp>
+        <p:nvSpPr>
+          <p:cNvPr id="5" name="副标题 4"/>
           <p:cNvSpPr>
             <a:spLocks noGrp="1"/>
           </p:cNvSpPr>
@@ -3031,11 +3098,7 @@
           <a:bodyPr/>
           <a:lstStyle/>
           <a:p>
-            <a:r>
-              <a:rPr lang="en-US" altLang="zh-CN" dirty="0" smtClean="0"/>
-              <a:t>The GATHEROOM Project</a:t>
-            </a:r>
-            <a:endParaRPr lang="zh-TW" altLang="en-US" dirty="0"/>
+            <a:endParaRPr lang="zh-TW" altLang="en-US"/>
           </a:p>
         </p:txBody>
       </p:sp>
@@ -3849,13 +3912,7 @@
               <a:rPr lang="en-US" altLang="zh-TW" dirty="0" smtClean="0">
                 <a:hlinkClick r:id="rId3"/>
               </a:rPr>
-              <a:t>http://</a:t>
-            </a:r>
-            <a:r>
-              <a:rPr lang="en-US" altLang="zh-TW" dirty="0" smtClean="0">
-                <a:hlinkClick r:id="rId3"/>
-              </a:rPr>
-              <a:t>blog.tonycube.com/2012/02/html5-canvas-1-canvas.html</a:t>
+              <a:t>http://blog.tonycube.com/2012/02/html5-canvas-1-canvas.html</a:t>
             </a:r>
             <a:endParaRPr lang="en-US" altLang="zh-TW" dirty="0" smtClean="0"/>
           </a:p>
@@ -3982,7 +4039,15 @@
             </a:r>
             <a:r>
               <a:rPr lang="en-US" altLang="zh-TW" dirty="0" smtClean="0"/>
-              <a:t> is one feature of the GATHEROOM project which is to provide an online white board application for people and community who has the demand for interactive online discussion, education, or presentation from different location.</a:t>
+              <a:t> is one feature of the </a:t>
+            </a:r>
+            <a:r>
+              <a:rPr lang="en-US" altLang="zh-TW" dirty="0" smtClean="0"/>
+              <a:t>GatherHub project </a:t>
+            </a:r>
+            <a:r>
+              <a:rPr lang="en-US" altLang="zh-TW" dirty="0" smtClean="0"/>
+              <a:t>which is to provide an online white board application for people and community who has the demand for interactive online discussion, education, or presentation from different location.</a:t>
             </a:r>
           </a:p>
           <a:p>

</xml_diff>

<commit_message>
Update Teleboard design note and remove useless .ico file
</commit_message>
<xml_diff>
--- a/doc/Design Note - Teleboard.pptx
+++ b/doc/Design Note - Teleboard.pptx
@@ -260,7 +260,7 @@
           <a:p>
             <a:fld id="{436FB6E3-5D8B-406C-9076-B29BD2B6DA25}" type="datetimeFigureOut">
               <a:rPr lang="zh-TW" altLang="en-US" smtClean="0"/>
-              <a:t>2015/9/30</a:t>
+              <a:t>2015/10/3</a:t>
             </a:fld>
             <a:endParaRPr lang="zh-TW" altLang="en-US"/>
           </a:p>
@@ -430,7 +430,7 @@
           <a:p>
             <a:fld id="{436FB6E3-5D8B-406C-9076-B29BD2B6DA25}" type="datetimeFigureOut">
               <a:rPr lang="zh-TW" altLang="en-US" smtClean="0"/>
-              <a:t>2015/9/30</a:t>
+              <a:t>2015/10/3</a:t>
             </a:fld>
             <a:endParaRPr lang="zh-TW" altLang="en-US"/>
           </a:p>
@@ -610,7 +610,7 @@
           <a:p>
             <a:fld id="{436FB6E3-5D8B-406C-9076-B29BD2B6DA25}" type="datetimeFigureOut">
               <a:rPr lang="zh-TW" altLang="en-US" smtClean="0"/>
-              <a:t>2015/9/30</a:t>
+              <a:t>2015/10/3</a:t>
             </a:fld>
             <a:endParaRPr lang="zh-TW" altLang="en-US"/>
           </a:p>
@@ -780,7 +780,7 @@
           <a:p>
             <a:fld id="{436FB6E3-5D8B-406C-9076-B29BD2B6DA25}" type="datetimeFigureOut">
               <a:rPr lang="zh-TW" altLang="en-US" smtClean="0"/>
-              <a:t>2015/9/30</a:t>
+              <a:t>2015/10/3</a:t>
             </a:fld>
             <a:endParaRPr lang="zh-TW" altLang="en-US"/>
           </a:p>
@@ -1026,7 +1026,7 @@
           <a:p>
             <a:fld id="{436FB6E3-5D8B-406C-9076-B29BD2B6DA25}" type="datetimeFigureOut">
               <a:rPr lang="zh-TW" altLang="en-US" smtClean="0"/>
-              <a:t>2015/9/30</a:t>
+              <a:t>2015/10/3</a:t>
             </a:fld>
             <a:endParaRPr lang="zh-TW" altLang="en-US"/>
           </a:p>
@@ -1258,7 +1258,7 @@
           <a:p>
             <a:fld id="{436FB6E3-5D8B-406C-9076-B29BD2B6DA25}" type="datetimeFigureOut">
               <a:rPr lang="zh-TW" altLang="en-US" smtClean="0"/>
-              <a:t>2015/9/30</a:t>
+              <a:t>2015/10/3</a:t>
             </a:fld>
             <a:endParaRPr lang="zh-TW" altLang="en-US"/>
           </a:p>
@@ -1625,7 +1625,7 @@
           <a:p>
             <a:fld id="{436FB6E3-5D8B-406C-9076-B29BD2B6DA25}" type="datetimeFigureOut">
               <a:rPr lang="zh-TW" altLang="en-US" smtClean="0"/>
-              <a:t>2015/9/30</a:t>
+              <a:t>2015/10/3</a:t>
             </a:fld>
             <a:endParaRPr lang="zh-TW" altLang="en-US"/>
           </a:p>
@@ -1743,7 +1743,7 @@
           <a:p>
             <a:fld id="{436FB6E3-5D8B-406C-9076-B29BD2B6DA25}" type="datetimeFigureOut">
               <a:rPr lang="zh-TW" altLang="en-US" smtClean="0"/>
-              <a:t>2015/9/30</a:t>
+              <a:t>2015/10/3</a:t>
             </a:fld>
             <a:endParaRPr lang="zh-TW" altLang="en-US"/>
           </a:p>
@@ -1838,7 +1838,7 @@
           <a:p>
             <a:fld id="{436FB6E3-5D8B-406C-9076-B29BD2B6DA25}" type="datetimeFigureOut">
               <a:rPr lang="zh-TW" altLang="en-US" smtClean="0"/>
-              <a:t>2015/9/30</a:t>
+              <a:t>2015/10/3</a:t>
             </a:fld>
             <a:endParaRPr lang="zh-TW" altLang="en-US"/>
           </a:p>
@@ -2115,7 +2115,7 @@
           <a:p>
             <a:fld id="{436FB6E3-5D8B-406C-9076-B29BD2B6DA25}" type="datetimeFigureOut">
               <a:rPr lang="zh-TW" altLang="en-US" smtClean="0"/>
-              <a:t>2015/9/30</a:t>
+              <a:t>2015/10/3</a:t>
             </a:fld>
             <a:endParaRPr lang="zh-TW" altLang="en-US"/>
           </a:p>
@@ -2368,7 +2368,7 @@
           <a:p>
             <a:fld id="{436FB6E3-5D8B-406C-9076-B29BD2B6DA25}" type="datetimeFigureOut">
               <a:rPr lang="zh-TW" altLang="en-US" smtClean="0"/>
-              <a:t>2015/9/30</a:t>
+              <a:t>2015/10/3</a:t>
             </a:fld>
             <a:endParaRPr lang="zh-TW" altLang="en-US"/>
           </a:p>
@@ -2581,7 +2581,7 @@
           <a:p>
             <a:fld id="{436FB6E3-5D8B-406C-9076-B29BD2B6DA25}" type="datetimeFigureOut">
               <a:rPr lang="zh-TW" altLang="en-US" smtClean="0"/>
-              <a:t>2015/9/30</a:t>
+              <a:t>2015/10/3</a:t>
             </a:fld>
             <a:endParaRPr lang="zh-TW" altLang="en-US"/>
           </a:p>
@@ -4137,23 +4137,11 @@
             </a:r>
             <a:r>
               <a:rPr lang="en-US" altLang="zh-TW" dirty="0" smtClean="0"/>
-              <a:t>is a website project to provide web based conference room application </a:t>
-            </a:r>
-            <a:r>
-              <a:rPr lang="en-US" altLang="zh-TW" dirty="0" smtClean="0"/>
-              <a:t>to </a:t>
-            </a:r>
-            <a:r>
-              <a:rPr lang="en-US" altLang="zh-TW" dirty="0" smtClean="0"/>
-              <a:t>serve the increasing distributed communication </a:t>
+              <a:t>is a website project to provide web based conference room application to serve the increasing distributed communication </a:t>
             </a:r>
             <a:r>
               <a:rPr lang="en-US" altLang="zh-TW" smtClean="0"/>
-              <a:t>need</a:t>
-            </a:r>
-            <a:r>
-              <a:rPr lang="en-US" altLang="zh-TW" smtClean="0"/>
-              <a:t>.</a:t>
+              <a:t>need.</a:t>
             </a:r>
             <a:endParaRPr lang="en-US" altLang="zh-TW" dirty="0" smtClean="0"/>
           </a:p>
@@ -5472,15 +5460,7 @@
             </a:r>
             <a:r>
               <a:rPr lang="en-US" altLang="zh-TW" dirty="0" smtClean="0"/>
-              <a:t>Save </a:t>
-            </a:r>
-            <a:r>
-              <a:rPr lang="en-US" altLang="zh-TW" dirty="0" smtClean="0"/>
-              <a:t>(full log) </a:t>
-            </a:r>
-            <a:r>
-              <a:rPr lang="en-US" altLang="zh-TW" dirty="0" smtClean="0"/>
-              <a:t>&amp; </a:t>
+              <a:t>Save (full log) &amp; </a:t>
             </a:r>
             <a:r>
               <a:rPr lang="en-US" altLang="zh-TW" dirty="0"/>

</xml_diff>